<commit_message>
Modify UG, DG and PPP for Chart feature
</commit_message>
<xml_diff>
--- a/docs/diagrams/Chart_ModelComponentClassBetterOopDiagram.pptx
+++ b/docs/diagrams/Chart_ModelComponentClassBetterOopDiagram.pptx
@@ -208,7 +208,7 @@
           <a:p>
             <a:fld id="{F5CC4B3F-88C1-4FFA-B1B6-F41C21DC6924}" type="datetimeFigureOut">
               <a:rPr lang="en-US" smtClean="0"/>
-              <a:t>09-Apr-19</a:t>
+              <a:t>13-Apr-19</a:t>
             </a:fld>
             <a:endParaRPr lang="en-US"/>
           </a:p>
@@ -654,7 +654,7 @@
           <a:p>
             <a:fld id="{78C97017-6FC3-485B-9764-EAC9E56C1D49}" type="datetimeFigureOut">
               <a:rPr lang="en-US" smtClean="0"/>
-              <a:t>09-Apr-19</a:t>
+              <a:t>13-Apr-19</a:t>
             </a:fld>
             <a:endParaRPr lang="en-US"/>
           </a:p>
@@ -822,7 +822,7 @@
           <a:p>
             <a:fld id="{78C97017-6FC3-485B-9764-EAC9E56C1D49}" type="datetimeFigureOut">
               <a:rPr lang="en-US" smtClean="0"/>
-              <a:t>09-Apr-19</a:t>
+              <a:t>13-Apr-19</a:t>
             </a:fld>
             <a:endParaRPr lang="en-US"/>
           </a:p>
@@ -1000,7 +1000,7 @@
           <a:p>
             <a:fld id="{78C97017-6FC3-485B-9764-EAC9E56C1D49}" type="datetimeFigureOut">
               <a:rPr lang="en-US" smtClean="0"/>
-              <a:t>09-Apr-19</a:t>
+              <a:t>13-Apr-19</a:t>
             </a:fld>
             <a:endParaRPr lang="en-US"/>
           </a:p>
@@ -1168,7 +1168,7 @@
           <a:p>
             <a:fld id="{78C97017-6FC3-485B-9764-EAC9E56C1D49}" type="datetimeFigureOut">
               <a:rPr lang="en-US" smtClean="0"/>
-              <a:t>09-Apr-19</a:t>
+              <a:t>13-Apr-19</a:t>
             </a:fld>
             <a:endParaRPr lang="en-US"/>
           </a:p>
@@ -1413,7 +1413,7 @@
           <a:p>
             <a:fld id="{78C97017-6FC3-485B-9764-EAC9E56C1D49}" type="datetimeFigureOut">
               <a:rPr lang="en-US" smtClean="0"/>
-              <a:t>09-Apr-19</a:t>
+              <a:t>13-Apr-19</a:t>
             </a:fld>
             <a:endParaRPr lang="en-US"/>
           </a:p>
@@ -1698,7 +1698,7 @@
           <a:p>
             <a:fld id="{78C97017-6FC3-485B-9764-EAC9E56C1D49}" type="datetimeFigureOut">
               <a:rPr lang="en-US" smtClean="0"/>
-              <a:t>09-Apr-19</a:t>
+              <a:t>13-Apr-19</a:t>
             </a:fld>
             <a:endParaRPr lang="en-US"/>
           </a:p>
@@ -2117,7 +2117,7 @@
           <a:p>
             <a:fld id="{78C97017-6FC3-485B-9764-EAC9E56C1D49}" type="datetimeFigureOut">
               <a:rPr lang="en-US" smtClean="0"/>
-              <a:t>09-Apr-19</a:t>
+              <a:t>13-Apr-19</a:t>
             </a:fld>
             <a:endParaRPr lang="en-US"/>
           </a:p>
@@ -2234,7 +2234,7 @@
           <a:p>
             <a:fld id="{78C97017-6FC3-485B-9764-EAC9E56C1D49}" type="datetimeFigureOut">
               <a:rPr lang="en-US" smtClean="0"/>
-              <a:t>09-Apr-19</a:t>
+              <a:t>13-Apr-19</a:t>
             </a:fld>
             <a:endParaRPr lang="en-US"/>
           </a:p>
@@ -2329,7 +2329,7 @@
           <a:p>
             <a:fld id="{78C97017-6FC3-485B-9764-EAC9E56C1D49}" type="datetimeFigureOut">
               <a:rPr lang="en-US" smtClean="0"/>
-              <a:t>09-Apr-19</a:t>
+              <a:t>13-Apr-19</a:t>
             </a:fld>
             <a:endParaRPr lang="en-US"/>
           </a:p>
@@ -2604,7 +2604,7 @@
           <a:p>
             <a:fld id="{78C97017-6FC3-485B-9764-EAC9E56C1D49}" type="datetimeFigureOut">
               <a:rPr lang="en-US" smtClean="0"/>
-              <a:t>09-Apr-19</a:t>
+              <a:t>13-Apr-19</a:t>
             </a:fld>
             <a:endParaRPr lang="en-US"/>
           </a:p>
@@ -2856,7 +2856,7 @@
           <a:p>
             <a:fld id="{78C97017-6FC3-485B-9764-EAC9E56C1D49}" type="datetimeFigureOut">
               <a:rPr lang="en-US" smtClean="0"/>
-              <a:t>09-Apr-19</a:t>
+              <a:t>13-Apr-19</a:t>
             </a:fld>
             <a:endParaRPr lang="en-US"/>
           </a:p>
@@ -3067,7 +3067,7 @@
           <a:p>
             <a:fld id="{78C97017-6FC3-485B-9764-EAC9E56C1D49}" type="datetimeFigureOut">
               <a:rPr lang="en-US" smtClean="0"/>
-              <a:t>09-Apr-19</a:t>
+              <a:t>13-Apr-19</a:t>
             </a:fld>
             <a:endParaRPr lang="en-US"/>
           </a:p>
@@ -5746,6 +5746,767 @@
           <a:p>
             <a:pPr algn="ctr"/>
             <a:endParaRPr lang="en-US" sz="1050"/>
+          </a:p>
+        </p:txBody>
+      </p:sp>
+      <p:sp>
+        <p:nvSpPr>
+          <p:cNvPr id="59" name="Octagon 58">
+            <a:extLst>
+              <a:ext uri="{FF2B5EF4-FFF2-40B4-BE49-F238E27FC236}">
+                <a16:creationId xmlns:a16="http://schemas.microsoft.com/office/drawing/2014/main" id="{41C59184-3F4C-4CAC-9E57-6C4C90678602}"/>
+              </a:ext>
+            </a:extLst>
+          </p:cNvPr>
+          <p:cNvSpPr/>
+          <p:nvPr/>
+        </p:nvSpPr>
+        <p:spPr>
+          <a:xfrm>
+            <a:off x="2229160" y="1638300"/>
+            <a:ext cx="252000" cy="252000"/>
+          </a:xfrm>
+          <a:prstGeom prst="octagon">
+            <a:avLst/>
+          </a:prstGeom>
+          <a:solidFill>
+            <a:schemeClr val="accent6"/>
+          </a:solidFill>
+          <a:ln w="12700">
+            <a:solidFill>
+              <a:schemeClr val="tx1"/>
+            </a:solidFill>
+          </a:ln>
+        </p:spPr>
+        <p:style>
+          <a:lnRef idx="0">
+            <a:scrgbClr r="0" g="0" b="0"/>
+          </a:lnRef>
+          <a:fillRef idx="0">
+            <a:scrgbClr r="0" g="0" b="0"/>
+          </a:fillRef>
+          <a:effectRef idx="0">
+            <a:scrgbClr r="0" g="0" b="0"/>
+          </a:effectRef>
+          <a:fontRef idx="minor">
+            <a:schemeClr val="lt1"/>
+          </a:fontRef>
+        </p:style>
+        <p:txBody>
+          <a:bodyPr rtlCol="0" anchor="ctr"/>
+          <a:lstStyle/>
+          <a:p>
+            <a:pPr algn="ctr"/>
+            <a:r>
+              <a:rPr lang="en-US" dirty="0"/>
+              <a:t>1</a:t>
+            </a:r>
+          </a:p>
+        </p:txBody>
+      </p:sp>
+      <p:sp>
+        <p:nvSpPr>
+          <p:cNvPr id="67" name="Octagon 66">
+            <a:extLst>
+              <a:ext uri="{FF2B5EF4-FFF2-40B4-BE49-F238E27FC236}">
+                <a16:creationId xmlns:a16="http://schemas.microsoft.com/office/drawing/2014/main" id="{AC51A933-CC72-41F9-A03B-2C17454C9B25}"/>
+              </a:ext>
+            </a:extLst>
+          </p:cNvPr>
+          <p:cNvSpPr/>
+          <p:nvPr/>
+        </p:nvSpPr>
+        <p:spPr>
+          <a:xfrm>
+            <a:off x="2229160" y="2452591"/>
+            <a:ext cx="252000" cy="252000"/>
+          </a:xfrm>
+          <a:prstGeom prst="octagon">
+            <a:avLst/>
+          </a:prstGeom>
+          <a:solidFill>
+            <a:schemeClr val="accent6"/>
+          </a:solidFill>
+          <a:ln w="12700">
+            <a:solidFill>
+              <a:schemeClr val="tx1"/>
+            </a:solidFill>
+          </a:ln>
+        </p:spPr>
+        <p:style>
+          <a:lnRef idx="0">
+            <a:scrgbClr r="0" g="0" b="0"/>
+          </a:lnRef>
+          <a:fillRef idx="0">
+            <a:scrgbClr r="0" g="0" b="0"/>
+          </a:fillRef>
+          <a:effectRef idx="0">
+            <a:scrgbClr r="0" g="0" b="0"/>
+          </a:effectRef>
+          <a:fontRef idx="minor">
+            <a:schemeClr val="lt1"/>
+          </a:fontRef>
+        </p:style>
+        <p:txBody>
+          <a:bodyPr rtlCol="0" anchor="ctr"/>
+          <a:lstStyle/>
+          <a:p>
+            <a:pPr algn="ctr"/>
+            <a:r>
+              <a:rPr lang="en-US" dirty="0"/>
+              <a:t>2</a:t>
+            </a:r>
+          </a:p>
+        </p:txBody>
+      </p:sp>
+      <p:sp>
+        <p:nvSpPr>
+          <p:cNvPr id="68" name="Octagon 67">
+            <a:extLst>
+              <a:ext uri="{FF2B5EF4-FFF2-40B4-BE49-F238E27FC236}">
+                <a16:creationId xmlns:a16="http://schemas.microsoft.com/office/drawing/2014/main" id="{44A2842C-1E44-4FDE-9833-DCE3D62089A6}"/>
+              </a:ext>
+            </a:extLst>
+          </p:cNvPr>
+          <p:cNvSpPr/>
+          <p:nvPr/>
+        </p:nvSpPr>
+        <p:spPr>
+          <a:xfrm>
+            <a:off x="1782495" y="3604155"/>
+            <a:ext cx="252000" cy="252000"/>
+          </a:xfrm>
+          <a:prstGeom prst="octagon">
+            <a:avLst/>
+          </a:prstGeom>
+          <a:solidFill>
+            <a:schemeClr val="accent6"/>
+          </a:solidFill>
+          <a:ln w="12700">
+            <a:solidFill>
+              <a:schemeClr val="tx1"/>
+            </a:solidFill>
+          </a:ln>
+        </p:spPr>
+        <p:style>
+          <a:lnRef idx="0">
+            <a:scrgbClr r="0" g="0" b="0"/>
+          </a:lnRef>
+          <a:fillRef idx="0">
+            <a:scrgbClr r="0" g="0" b="0"/>
+          </a:fillRef>
+          <a:effectRef idx="0">
+            <a:scrgbClr r="0" g="0" b="0"/>
+          </a:effectRef>
+          <a:fontRef idx="minor">
+            <a:schemeClr val="lt1"/>
+          </a:fontRef>
+        </p:style>
+        <p:txBody>
+          <a:bodyPr rtlCol="0" anchor="ctr"/>
+          <a:lstStyle/>
+          <a:p>
+            <a:pPr algn="ctr"/>
+            <a:r>
+              <a:rPr lang="en-US" dirty="0"/>
+              <a:t>3</a:t>
+            </a:r>
+          </a:p>
+        </p:txBody>
+      </p:sp>
+      <p:sp>
+        <p:nvSpPr>
+          <p:cNvPr id="71" name="Octagon 70">
+            <a:extLst>
+              <a:ext uri="{FF2B5EF4-FFF2-40B4-BE49-F238E27FC236}">
+                <a16:creationId xmlns:a16="http://schemas.microsoft.com/office/drawing/2014/main" id="{4513B15F-85CE-41F6-9B52-6E10EBB1B263}"/>
+              </a:ext>
+            </a:extLst>
+          </p:cNvPr>
+          <p:cNvSpPr/>
+          <p:nvPr/>
+        </p:nvSpPr>
+        <p:spPr>
+          <a:xfrm>
+            <a:off x="3692966" y="2948067"/>
+            <a:ext cx="252000" cy="252000"/>
+          </a:xfrm>
+          <a:prstGeom prst="octagon">
+            <a:avLst/>
+          </a:prstGeom>
+          <a:solidFill>
+            <a:schemeClr val="accent6"/>
+          </a:solidFill>
+          <a:ln w="12700">
+            <a:solidFill>
+              <a:schemeClr val="tx1"/>
+            </a:solidFill>
+          </a:ln>
+        </p:spPr>
+        <p:style>
+          <a:lnRef idx="0">
+            <a:scrgbClr r="0" g="0" b="0"/>
+          </a:lnRef>
+          <a:fillRef idx="0">
+            <a:scrgbClr r="0" g="0" b="0"/>
+          </a:fillRef>
+          <a:effectRef idx="0">
+            <a:scrgbClr r="0" g="0" b="0"/>
+          </a:effectRef>
+          <a:fontRef idx="minor">
+            <a:schemeClr val="lt1"/>
+          </a:fontRef>
+        </p:style>
+        <p:txBody>
+          <a:bodyPr rtlCol="0" anchor="ctr"/>
+          <a:lstStyle/>
+          <a:p>
+            <a:pPr algn="ctr"/>
+            <a:r>
+              <a:rPr lang="en-US" dirty="0"/>
+              <a:t>4</a:t>
+            </a:r>
+          </a:p>
+        </p:txBody>
+      </p:sp>
+      <p:sp>
+        <p:nvSpPr>
+          <p:cNvPr id="72" name="Octagon 71">
+            <a:extLst>
+              <a:ext uri="{FF2B5EF4-FFF2-40B4-BE49-F238E27FC236}">
+                <a16:creationId xmlns:a16="http://schemas.microsoft.com/office/drawing/2014/main" id="{869B90C0-62BC-4BFE-B022-79C3487806CF}"/>
+              </a:ext>
+            </a:extLst>
+          </p:cNvPr>
+          <p:cNvSpPr/>
+          <p:nvPr/>
+        </p:nvSpPr>
+        <p:spPr>
+          <a:xfrm>
+            <a:off x="5505843" y="2415000"/>
+            <a:ext cx="252000" cy="252000"/>
+          </a:xfrm>
+          <a:prstGeom prst="octagon">
+            <a:avLst/>
+          </a:prstGeom>
+          <a:solidFill>
+            <a:schemeClr val="accent6"/>
+          </a:solidFill>
+          <a:ln w="12700">
+            <a:solidFill>
+              <a:schemeClr val="tx1"/>
+            </a:solidFill>
+          </a:ln>
+        </p:spPr>
+        <p:style>
+          <a:lnRef idx="0">
+            <a:scrgbClr r="0" g="0" b="0"/>
+          </a:lnRef>
+          <a:fillRef idx="0">
+            <a:scrgbClr r="0" g="0" b="0"/>
+          </a:fillRef>
+          <a:effectRef idx="0">
+            <a:scrgbClr r="0" g="0" b="0"/>
+          </a:effectRef>
+          <a:fontRef idx="minor">
+            <a:schemeClr val="lt1"/>
+          </a:fontRef>
+        </p:style>
+        <p:txBody>
+          <a:bodyPr rtlCol="0" anchor="ctr"/>
+          <a:lstStyle/>
+          <a:p>
+            <a:pPr algn="ctr"/>
+            <a:r>
+              <a:rPr lang="en-US" dirty="0"/>
+              <a:t>5</a:t>
+            </a:r>
+          </a:p>
+        </p:txBody>
+      </p:sp>
+      <p:sp>
+        <p:nvSpPr>
+          <p:cNvPr id="93" name="Rectangle 62">
+            <a:extLst>
+              <a:ext uri="{FF2B5EF4-FFF2-40B4-BE49-F238E27FC236}">
+                <a16:creationId xmlns:a16="http://schemas.microsoft.com/office/drawing/2014/main" id="{91C063D4-6481-40C3-B43D-93EDAA91D53E}"/>
+              </a:ext>
+            </a:extLst>
+          </p:cNvPr>
+          <p:cNvSpPr/>
+          <p:nvPr/>
+        </p:nvSpPr>
+        <p:spPr>
+          <a:xfrm>
+            <a:off x="1189062" y="1200640"/>
+            <a:ext cx="1093635" cy="346760"/>
+          </a:xfrm>
+          <a:prstGeom prst="rect">
+            <a:avLst/>
+          </a:prstGeom>
+          <a:solidFill>
+            <a:srgbClr val="7030A0"/>
+          </a:solidFill>
+          <a:ln w="19050">
+            <a:solidFill>
+              <a:srgbClr val="7030A0"/>
+            </a:solidFill>
+          </a:ln>
+          <a:effectLst/>
+        </p:spPr>
+        <p:style>
+          <a:lnRef idx="1">
+            <a:schemeClr val="accent2"/>
+          </a:lnRef>
+          <a:fillRef idx="2">
+            <a:schemeClr val="accent2"/>
+          </a:fillRef>
+          <a:effectRef idx="1">
+            <a:schemeClr val="accent2"/>
+          </a:effectRef>
+          <a:fontRef idx="minor">
+            <a:schemeClr val="dk1"/>
+          </a:fontRef>
+        </p:style>
+        <p:txBody>
+          <a:bodyPr rtlCol="0" anchor="ctr"/>
+          <a:lstStyle/>
+          <a:p>
+            <a:pPr algn="ctr"/>
+            <a:r>
+              <a:rPr lang="en-US" sz="1050" dirty="0">
+                <a:solidFill>
+                  <a:schemeClr val="bg1"/>
+                </a:solidFill>
+              </a:rPr>
+              <a:t>ModelManager</a:t>
+            </a:r>
+            <a:endParaRPr lang="en-SG" sz="1050" dirty="0">
+              <a:solidFill>
+                <a:schemeClr val="bg1"/>
+              </a:solidFill>
+            </a:endParaRPr>
+          </a:p>
+        </p:txBody>
+      </p:sp>
+      <p:cxnSp>
+        <p:nvCxnSpPr>
+          <p:cNvPr id="97" name="Straight Arrow Connector 56">
+            <a:extLst>
+              <a:ext uri="{FF2B5EF4-FFF2-40B4-BE49-F238E27FC236}">
+                <a16:creationId xmlns:a16="http://schemas.microsoft.com/office/drawing/2014/main" id="{1F54110A-F9FC-4F12-A279-F681E25993E5}"/>
+              </a:ext>
+            </a:extLst>
+          </p:cNvPr>
+          <p:cNvCxnSpPr>
+            <a:cxnSpLocks/>
+            <a:stCxn id="98" idx="2"/>
+            <a:endCxn id="40" idx="0"/>
+          </p:cNvCxnSpPr>
+          <p:nvPr/>
+        </p:nvCxnSpPr>
+        <p:spPr>
+          <a:xfrm rot="5400000">
+            <a:off x="1635370" y="1879015"/>
+            <a:ext cx="202696" cy="1675"/>
+          </a:xfrm>
+          <a:prstGeom prst="bentConnector3">
+            <a:avLst>
+              <a:gd name="adj1" fmla="val 50000"/>
+            </a:avLst>
+          </a:prstGeom>
+          <a:ln w="19050">
+            <a:solidFill>
+              <a:srgbClr val="7030A0"/>
+            </a:solidFill>
+            <a:headEnd type="none" w="med" len="med"/>
+            <a:tailEnd type="arrow" w="med" len="med"/>
+          </a:ln>
+          <a:effectLst/>
+        </p:spPr>
+        <p:style>
+          <a:lnRef idx="1">
+            <a:schemeClr val="accent2"/>
+          </a:lnRef>
+          <a:fillRef idx="2">
+            <a:schemeClr val="accent2"/>
+          </a:fillRef>
+          <a:effectRef idx="1">
+            <a:schemeClr val="accent2"/>
+          </a:effectRef>
+          <a:fontRef idx="minor">
+            <a:schemeClr val="dk1"/>
+          </a:fontRef>
+        </p:style>
+      </p:cxnSp>
+      <p:sp>
+        <p:nvSpPr>
+          <p:cNvPr id="98" name="Flowchart: Decision 96">
+            <a:extLst>
+              <a:ext uri="{FF2B5EF4-FFF2-40B4-BE49-F238E27FC236}">
+                <a16:creationId xmlns:a16="http://schemas.microsoft.com/office/drawing/2014/main" id="{91DEF679-9058-4787-9A4F-C5402E8EFEDC}"/>
+              </a:ext>
+            </a:extLst>
+          </p:cNvPr>
+          <p:cNvSpPr/>
+          <p:nvPr/>
+        </p:nvSpPr>
+        <p:spPr>
+          <a:xfrm>
+            <a:off x="1619531" y="1560594"/>
+            <a:ext cx="236048" cy="217910"/>
+          </a:xfrm>
+          <a:prstGeom prst="flowChartDecision">
+            <a:avLst/>
+          </a:prstGeom>
+          <a:noFill/>
+          <a:ln w="19050">
+            <a:solidFill>
+              <a:srgbClr val="7030A0"/>
+            </a:solidFill>
+          </a:ln>
+          <a:effectLst/>
+        </p:spPr>
+        <p:style>
+          <a:lnRef idx="1">
+            <a:schemeClr val="accent6"/>
+          </a:lnRef>
+          <a:fillRef idx="2">
+            <a:schemeClr val="accent6"/>
+          </a:fillRef>
+          <a:effectRef idx="1">
+            <a:schemeClr val="accent6"/>
+          </a:effectRef>
+          <a:fontRef idx="minor">
+            <a:schemeClr val="dk1"/>
+          </a:fontRef>
+        </p:style>
+        <p:txBody>
+          <a:bodyPr rtlCol="0" anchor="ctr"/>
+          <a:lstStyle/>
+          <a:p>
+            <a:pPr algn="ctr"/>
+            <a:endParaRPr lang="en-US" sz="1050"/>
+          </a:p>
+        </p:txBody>
+      </p:sp>
+      <p:sp>
+        <p:nvSpPr>
+          <p:cNvPr id="99" name="TextBox 98">
+            <a:extLst>
+              <a:ext uri="{FF2B5EF4-FFF2-40B4-BE49-F238E27FC236}">
+                <a16:creationId xmlns:a16="http://schemas.microsoft.com/office/drawing/2014/main" id="{A762215D-77FF-43B3-8DCB-A031A9BE447E}"/>
+              </a:ext>
+            </a:extLst>
+          </p:cNvPr>
+          <p:cNvSpPr txBox="1"/>
+          <p:nvPr/>
+        </p:nvSpPr>
+        <p:spPr>
+          <a:xfrm>
+            <a:off x="1517223" y="1795305"/>
+            <a:ext cx="189257" cy="178683"/>
+          </a:xfrm>
+          <a:prstGeom prst="rect">
+            <a:avLst/>
+          </a:prstGeom>
+          <a:noFill/>
+        </p:spPr>
+        <p:txBody>
+          <a:bodyPr wrap="square" lIns="0" tIns="0" rIns="0" bIns="0" rtlCol="0">
+            <a:noAutofit/>
+          </a:bodyPr>
+          <a:lstStyle/>
+          <a:p>
+            <a:pPr algn="ctr"/>
+            <a:r>
+              <a:rPr lang="en-US" sz="1100" dirty="0">
+                <a:solidFill>
+                  <a:srgbClr val="7030A0"/>
+                </a:solidFill>
+              </a:rPr>
+              <a:t>1</a:t>
+            </a:r>
+            <a:endParaRPr lang="en-SG" sz="1100" dirty="0">
+              <a:solidFill>
+                <a:srgbClr val="7030A0"/>
+              </a:solidFill>
+            </a:endParaRPr>
+          </a:p>
+        </p:txBody>
+      </p:sp>
+      <p:sp>
+        <p:nvSpPr>
+          <p:cNvPr id="101" name="Octagon 100">
+            <a:extLst>
+              <a:ext uri="{FF2B5EF4-FFF2-40B4-BE49-F238E27FC236}">
+                <a16:creationId xmlns:a16="http://schemas.microsoft.com/office/drawing/2014/main" id="{1630157E-317C-4B5C-969B-F3B0925D86DB}"/>
+              </a:ext>
+            </a:extLst>
+          </p:cNvPr>
+          <p:cNvSpPr/>
+          <p:nvPr/>
+        </p:nvSpPr>
+        <p:spPr>
+          <a:xfrm>
+            <a:off x="5499558" y="3092085"/>
+            <a:ext cx="252000" cy="252000"/>
+          </a:xfrm>
+          <a:prstGeom prst="octagon">
+            <a:avLst/>
+          </a:prstGeom>
+          <a:solidFill>
+            <a:schemeClr val="accent6"/>
+          </a:solidFill>
+          <a:ln w="12700">
+            <a:solidFill>
+              <a:schemeClr val="tx1"/>
+            </a:solidFill>
+          </a:ln>
+        </p:spPr>
+        <p:style>
+          <a:lnRef idx="0">
+            <a:scrgbClr r="0" g="0" b="0"/>
+          </a:lnRef>
+          <a:fillRef idx="0">
+            <a:scrgbClr r="0" g="0" b="0"/>
+          </a:fillRef>
+          <a:effectRef idx="0">
+            <a:scrgbClr r="0" g="0" b="0"/>
+          </a:effectRef>
+          <a:fontRef idx="minor">
+            <a:schemeClr val="lt1"/>
+          </a:fontRef>
+        </p:style>
+        <p:txBody>
+          <a:bodyPr rtlCol="0" anchor="ctr"/>
+          <a:lstStyle/>
+          <a:p>
+            <a:pPr algn="ctr"/>
+            <a:r>
+              <a:rPr lang="en-US" dirty="0"/>
+              <a:t>5</a:t>
+            </a:r>
+          </a:p>
+        </p:txBody>
+      </p:sp>
+      <p:sp>
+        <p:nvSpPr>
+          <p:cNvPr id="102" name="Octagon 101">
+            <a:extLst>
+              <a:ext uri="{FF2B5EF4-FFF2-40B4-BE49-F238E27FC236}">
+                <a16:creationId xmlns:a16="http://schemas.microsoft.com/office/drawing/2014/main" id="{D0DA1C94-EB74-4BC3-9327-85124777C137}"/>
+              </a:ext>
+            </a:extLst>
+          </p:cNvPr>
+          <p:cNvSpPr/>
+          <p:nvPr/>
+        </p:nvSpPr>
+        <p:spPr>
+          <a:xfrm>
+            <a:off x="5504519" y="3784457"/>
+            <a:ext cx="252000" cy="252000"/>
+          </a:xfrm>
+          <a:prstGeom prst="octagon">
+            <a:avLst/>
+          </a:prstGeom>
+          <a:solidFill>
+            <a:schemeClr val="accent6"/>
+          </a:solidFill>
+          <a:ln w="12700">
+            <a:solidFill>
+              <a:schemeClr val="tx1"/>
+            </a:solidFill>
+          </a:ln>
+        </p:spPr>
+        <p:style>
+          <a:lnRef idx="0">
+            <a:scrgbClr r="0" g="0" b="0"/>
+          </a:lnRef>
+          <a:fillRef idx="0">
+            <a:scrgbClr r="0" g="0" b="0"/>
+          </a:fillRef>
+          <a:effectRef idx="0">
+            <a:scrgbClr r="0" g="0" b="0"/>
+          </a:effectRef>
+          <a:fontRef idx="minor">
+            <a:schemeClr val="lt1"/>
+          </a:fontRef>
+        </p:style>
+        <p:txBody>
+          <a:bodyPr rtlCol="0" anchor="ctr"/>
+          <a:lstStyle/>
+          <a:p>
+            <a:pPr algn="ctr"/>
+            <a:r>
+              <a:rPr lang="en-US" dirty="0"/>
+              <a:t>5</a:t>
+            </a:r>
+          </a:p>
+        </p:txBody>
+      </p:sp>
+      <p:sp>
+        <p:nvSpPr>
+          <p:cNvPr id="103" name="Octagon 102">
+            <a:extLst>
+              <a:ext uri="{FF2B5EF4-FFF2-40B4-BE49-F238E27FC236}">
+                <a16:creationId xmlns:a16="http://schemas.microsoft.com/office/drawing/2014/main" id="{91AA6C10-7323-4E85-84D8-79EE05A354E5}"/>
+              </a:ext>
+            </a:extLst>
+          </p:cNvPr>
+          <p:cNvSpPr/>
+          <p:nvPr/>
+        </p:nvSpPr>
+        <p:spPr>
+          <a:xfrm>
+            <a:off x="6814424" y="2403901"/>
+            <a:ext cx="252000" cy="252000"/>
+          </a:xfrm>
+          <a:prstGeom prst="octagon">
+            <a:avLst/>
+          </a:prstGeom>
+          <a:solidFill>
+            <a:schemeClr val="accent6"/>
+          </a:solidFill>
+          <a:ln w="12700">
+            <a:solidFill>
+              <a:schemeClr val="tx1"/>
+            </a:solidFill>
+          </a:ln>
+        </p:spPr>
+        <p:style>
+          <a:lnRef idx="0">
+            <a:scrgbClr r="0" g="0" b="0"/>
+          </a:lnRef>
+          <a:fillRef idx="0">
+            <a:scrgbClr r="0" g="0" b="0"/>
+          </a:fillRef>
+          <a:effectRef idx="0">
+            <a:scrgbClr r="0" g="0" b="0"/>
+          </a:effectRef>
+          <a:fontRef idx="minor">
+            <a:schemeClr val="lt1"/>
+          </a:fontRef>
+        </p:style>
+        <p:txBody>
+          <a:bodyPr rtlCol="0" anchor="ctr"/>
+          <a:lstStyle/>
+          <a:p>
+            <a:pPr algn="ctr"/>
+            <a:r>
+              <a:rPr lang="en-US" dirty="0"/>
+              <a:t>6</a:t>
+            </a:r>
+          </a:p>
+        </p:txBody>
+      </p:sp>
+      <p:sp>
+        <p:nvSpPr>
+          <p:cNvPr id="104" name="Octagon 103">
+            <a:extLst>
+              <a:ext uri="{FF2B5EF4-FFF2-40B4-BE49-F238E27FC236}">
+                <a16:creationId xmlns:a16="http://schemas.microsoft.com/office/drawing/2014/main" id="{90490FFC-1F1A-4D37-9986-50B48D831971}"/>
+              </a:ext>
+            </a:extLst>
+          </p:cNvPr>
+          <p:cNvSpPr/>
+          <p:nvPr/>
+        </p:nvSpPr>
+        <p:spPr>
+          <a:xfrm>
+            <a:off x="6814424" y="3095775"/>
+            <a:ext cx="252000" cy="252000"/>
+          </a:xfrm>
+          <a:prstGeom prst="octagon">
+            <a:avLst/>
+          </a:prstGeom>
+          <a:solidFill>
+            <a:schemeClr val="accent6"/>
+          </a:solidFill>
+          <a:ln w="12700">
+            <a:solidFill>
+              <a:schemeClr val="tx1"/>
+            </a:solidFill>
+          </a:ln>
+        </p:spPr>
+        <p:style>
+          <a:lnRef idx="0">
+            <a:scrgbClr r="0" g="0" b="0"/>
+          </a:lnRef>
+          <a:fillRef idx="0">
+            <a:scrgbClr r="0" g="0" b="0"/>
+          </a:fillRef>
+          <a:effectRef idx="0">
+            <a:scrgbClr r="0" g="0" b="0"/>
+          </a:effectRef>
+          <a:fontRef idx="minor">
+            <a:schemeClr val="lt1"/>
+          </a:fontRef>
+        </p:style>
+        <p:txBody>
+          <a:bodyPr rtlCol="0" anchor="ctr"/>
+          <a:lstStyle/>
+          <a:p>
+            <a:pPr algn="ctr"/>
+            <a:r>
+              <a:rPr lang="en-US" dirty="0"/>
+              <a:t>6</a:t>
+            </a:r>
+          </a:p>
+        </p:txBody>
+      </p:sp>
+      <p:sp>
+        <p:nvSpPr>
+          <p:cNvPr id="105" name="Octagon 104">
+            <a:extLst>
+              <a:ext uri="{FF2B5EF4-FFF2-40B4-BE49-F238E27FC236}">
+                <a16:creationId xmlns:a16="http://schemas.microsoft.com/office/drawing/2014/main" id="{66B0E8B5-4623-4D7B-848C-3B6B53E0DF5A}"/>
+              </a:ext>
+            </a:extLst>
+          </p:cNvPr>
+          <p:cNvSpPr/>
+          <p:nvPr/>
+        </p:nvSpPr>
+        <p:spPr>
+          <a:xfrm>
+            <a:off x="6819194" y="3773863"/>
+            <a:ext cx="252000" cy="252000"/>
+          </a:xfrm>
+          <a:prstGeom prst="octagon">
+            <a:avLst/>
+          </a:prstGeom>
+          <a:solidFill>
+            <a:schemeClr val="accent6"/>
+          </a:solidFill>
+          <a:ln w="12700">
+            <a:solidFill>
+              <a:schemeClr val="tx1"/>
+            </a:solidFill>
+          </a:ln>
+        </p:spPr>
+        <p:style>
+          <a:lnRef idx="0">
+            <a:scrgbClr r="0" g="0" b="0"/>
+          </a:lnRef>
+          <a:fillRef idx="0">
+            <a:scrgbClr r="0" g="0" b="0"/>
+          </a:fillRef>
+          <a:effectRef idx="0">
+            <a:scrgbClr r="0" g="0" b="0"/>
+          </a:effectRef>
+          <a:fontRef idx="minor">
+            <a:schemeClr val="lt1"/>
+          </a:fontRef>
+        </p:style>
+        <p:txBody>
+          <a:bodyPr rtlCol="0" anchor="ctr"/>
+          <a:lstStyle/>
+          <a:p>
+            <a:pPr algn="ctr"/>
+            <a:r>
+              <a:rPr lang="en-US" dirty="0"/>
+              <a:t>6</a:t>
+            </a:r>
           </a:p>
         </p:txBody>
       </p:sp>

</xml_diff>

<commit_message>
Modify UG, DG and PPP
</commit_message>
<xml_diff>
--- a/docs/diagrams/Chart_ModelComponentClassBetterOopDiagram.pptx
+++ b/docs/diagrams/Chart_ModelComponentClassBetterOopDiagram.pptx
@@ -208,7 +208,7 @@
           <a:p>
             <a:fld id="{F5CC4B3F-88C1-4FFA-B1B6-F41C21DC6924}" type="datetimeFigureOut">
               <a:rPr lang="en-US" smtClean="0"/>
-              <a:t>13-Apr-19</a:t>
+              <a:t>15-Apr-19</a:t>
             </a:fld>
             <a:endParaRPr lang="en-US"/>
           </a:p>
@@ -654,7 +654,7 @@
           <a:p>
             <a:fld id="{78C97017-6FC3-485B-9764-EAC9E56C1D49}" type="datetimeFigureOut">
               <a:rPr lang="en-US" smtClean="0"/>
-              <a:t>13-Apr-19</a:t>
+              <a:t>15-Apr-19</a:t>
             </a:fld>
             <a:endParaRPr lang="en-US"/>
           </a:p>
@@ -822,7 +822,7 @@
           <a:p>
             <a:fld id="{78C97017-6FC3-485B-9764-EAC9E56C1D49}" type="datetimeFigureOut">
               <a:rPr lang="en-US" smtClean="0"/>
-              <a:t>13-Apr-19</a:t>
+              <a:t>15-Apr-19</a:t>
             </a:fld>
             <a:endParaRPr lang="en-US"/>
           </a:p>
@@ -1000,7 +1000,7 @@
           <a:p>
             <a:fld id="{78C97017-6FC3-485B-9764-EAC9E56C1D49}" type="datetimeFigureOut">
               <a:rPr lang="en-US" smtClean="0"/>
-              <a:t>13-Apr-19</a:t>
+              <a:t>15-Apr-19</a:t>
             </a:fld>
             <a:endParaRPr lang="en-US"/>
           </a:p>
@@ -1168,7 +1168,7 @@
           <a:p>
             <a:fld id="{78C97017-6FC3-485B-9764-EAC9E56C1D49}" type="datetimeFigureOut">
               <a:rPr lang="en-US" smtClean="0"/>
-              <a:t>13-Apr-19</a:t>
+              <a:t>15-Apr-19</a:t>
             </a:fld>
             <a:endParaRPr lang="en-US"/>
           </a:p>
@@ -1413,7 +1413,7 @@
           <a:p>
             <a:fld id="{78C97017-6FC3-485B-9764-EAC9E56C1D49}" type="datetimeFigureOut">
               <a:rPr lang="en-US" smtClean="0"/>
-              <a:t>13-Apr-19</a:t>
+              <a:t>15-Apr-19</a:t>
             </a:fld>
             <a:endParaRPr lang="en-US"/>
           </a:p>
@@ -1698,7 +1698,7 @@
           <a:p>
             <a:fld id="{78C97017-6FC3-485B-9764-EAC9E56C1D49}" type="datetimeFigureOut">
               <a:rPr lang="en-US" smtClean="0"/>
-              <a:t>13-Apr-19</a:t>
+              <a:t>15-Apr-19</a:t>
             </a:fld>
             <a:endParaRPr lang="en-US"/>
           </a:p>
@@ -2117,7 +2117,7 @@
           <a:p>
             <a:fld id="{78C97017-6FC3-485B-9764-EAC9E56C1D49}" type="datetimeFigureOut">
               <a:rPr lang="en-US" smtClean="0"/>
-              <a:t>13-Apr-19</a:t>
+              <a:t>15-Apr-19</a:t>
             </a:fld>
             <a:endParaRPr lang="en-US"/>
           </a:p>
@@ -2234,7 +2234,7 @@
           <a:p>
             <a:fld id="{78C97017-6FC3-485B-9764-EAC9E56C1D49}" type="datetimeFigureOut">
               <a:rPr lang="en-US" smtClean="0"/>
-              <a:t>13-Apr-19</a:t>
+              <a:t>15-Apr-19</a:t>
             </a:fld>
             <a:endParaRPr lang="en-US"/>
           </a:p>
@@ -2329,7 +2329,7 @@
           <a:p>
             <a:fld id="{78C97017-6FC3-485B-9764-EAC9E56C1D49}" type="datetimeFigureOut">
               <a:rPr lang="en-US" smtClean="0"/>
-              <a:t>13-Apr-19</a:t>
+              <a:t>15-Apr-19</a:t>
             </a:fld>
             <a:endParaRPr lang="en-US"/>
           </a:p>
@@ -2604,7 +2604,7 @@
           <a:p>
             <a:fld id="{78C97017-6FC3-485B-9764-EAC9E56C1D49}" type="datetimeFigureOut">
               <a:rPr lang="en-US" smtClean="0"/>
-              <a:t>13-Apr-19</a:t>
+              <a:t>15-Apr-19</a:t>
             </a:fld>
             <a:endParaRPr lang="en-US"/>
           </a:p>
@@ -2856,7 +2856,7 @@
           <a:p>
             <a:fld id="{78C97017-6FC3-485B-9764-EAC9E56C1D49}" type="datetimeFigureOut">
               <a:rPr lang="en-US" smtClean="0"/>
-              <a:t>13-Apr-19</a:t>
+              <a:t>15-Apr-19</a:t>
             </a:fld>
             <a:endParaRPr lang="en-US"/>
           </a:p>
@@ -3067,7 +3067,7 @@
           <a:p>
             <a:fld id="{78C97017-6FC3-485B-9764-EAC9E56C1D49}" type="datetimeFigureOut">
               <a:rPr lang="en-US" smtClean="0"/>
-              <a:t>13-Apr-19</a:t>
+              <a:t>15-Apr-19</a:t>
             </a:fld>
             <a:endParaRPr lang="en-US"/>
           </a:p>
@@ -6507,6 +6507,276 @@
               <a:rPr lang="en-US" dirty="0"/>
               <a:t>6</a:t>
             </a:r>
+          </a:p>
+        </p:txBody>
+      </p:sp>
+      <p:sp>
+        <p:nvSpPr>
+          <p:cNvPr id="76" name="TextBox 75">
+            <a:extLst>
+              <a:ext uri="{FF2B5EF4-FFF2-40B4-BE49-F238E27FC236}">
+                <a16:creationId xmlns:a16="http://schemas.microsoft.com/office/drawing/2014/main" id="{656A65F3-47BE-4F40-AD2D-0F8D990340C3}"/>
+              </a:ext>
+            </a:extLst>
+          </p:cNvPr>
+          <p:cNvSpPr txBox="1"/>
+          <p:nvPr/>
+        </p:nvSpPr>
+        <p:spPr>
+          <a:xfrm>
+            <a:off x="7219730" y="2638417"/>
+            <a:ext cx="189257" cy="178683"/>
+          </a:xfrm>
+          <a:prstGeom prst="rect">
+            <a:avLst/>
+          </a:prstGeom>
+          <a:noFill/>
+        </p:spPr>
+        <p:txBody>
+          <a:bodyPr wrap="square" lIns="0" tIns="0" rIns="0" bIns="0" rtlCol="0">
+            <a:noAutofit/>
+          </a:bodyPr>
+          <a:lstStyle/>
+          <a:p>
+            <a:pPr algn="ctr"/>
+            <a:r>
+              <a:rPr lang="en-US" sz="1100" dirty="0">
+                <a:solidFill>
+                  <a:srgbClr val="7030A0"/>
+                </a:solidFill>
+              </a:rPr>
+              <a:t>1</a:t>
+            </a:r>
+            <a:endParaRPr lang="en-SG" sz="1100" dirty="0">
+              <a:solidFill>
+                <a:srgbClr val="7030A0"/>
+              </a:solidFill>
+            </a:endParaRPr>
+          </a:p>
+        </p:txBody>
+      </p:sp>
+      <p:sp>
+        <p:nvSpPr>
+          <p:cNvPr id="79" name="TextBox 78">
+            <a:extLst>
+              <a:ext uri="{FF2B5EF4-FFF2-40B4-BE49-F238E27FC236}">
+                <a16:creationId xmlns:a16="http://schemas.microsoft.com/office/drawing/2014/main" id="{A0BD67A0-A9B1-4E54-93B2-8B412C6F6487}"/>
+              </a:ext>
+            </a:extLst>
+          </p:cNvPr>
+          <p:cNvSpPr txBox="1"/>
+          <p:nvPr/>
+        </p:nvSpPr>
+        <p:spPr>
+          <a:xfrm>
+            <a:off x="7234016" y="2984725"/>
+            <a:ext cx="189257" cy="178683"/>
+          </a:xfrm>
+          <a:prstGeom prst="rect">
+            <a:avLst/>
+          </a:prstGeom>
+          <a:noFill/>
+        </p:spPr>
+        <p:txBody>
+          <a:bodyPr wrap="square" lIns="0" tIns="0" rIns="0" bIns="0" rtlCol="0">
+            <a:noAutofit/>
+          </a:bodyPr>
+          <a:lstStyle/>
+          <a:p>
+            <a:pPr algn="ctr"/>
+            <a:r>
+              <a:rPr lang="en-US" sz="1100" dirty="0">
+                <a:solidFill>
+                  <a:srgbClr val="7030A0"/>
+                </a:solidFill>
+              </a:rPr>
+              <a:t>1</a:t>
+            </a:r>
+            <a:endParaRPr lang="en-SG" sz="1100" dirty="0">
+              <a:solidFill>
+                <a:srgbClr val="7030A0"/>
+              </a:solidFill>
+            </a:endParaRPr>
+          </a:p>
+        </p:txBody>
+      </p:sp>
+      <p:sp>
+        <p:nvSpPr>
+          <p:cNvPr id="85" name="TextBox 84">
+            <a:extLst>
+              <a:ext uri="{FF2B5EF4-FFF2-40B4-BE49-F238E27FC236}">
+                <a16:creationId xmlns:a16="http://schemas.microsoft.com/office/drawing/2014/main" id="{E3784313-4292-491B-8A82-EA9257DF310E}"/>
+              </a:ext>
+            </a:extLst>
+          </p:cNvPr>
+          <p:cNvSpPr txBox="1"/>
+          <p:nvPr/>
+        </p:nvSpPr>
+        <p:spPr>
+          <a:xfrm>
+            <a:off x="7230889" y="3360274"/>
+            <a:ext cx="189257" cy="178683"/>
+          </a:xfrm>
+          <a:prstGeom prst="rect">
+            <a:avLst/>
+          </a:prstGeom>
+          <a:noFill/>
+        </p:spPr>
+        <p:txBody>
+          <a:bodyPr wrap="square" lIns="0" tIns="0" rIns="0" bIns="0" rtlCol="0">
+            <a:noAutofit/>
+          </a:bodyPr>
+          <a:lstStyle/>
+          <a:p>
+            <a:pPr algn="ctr"/>
+            <a:r>
+              <a:rPr lang="en-US" sz="1100" dirty="0">
+                <a:solidFill>
+                  <a:srgbClr val="7030A0"/>
+                </a:solidFill>
+              </a:rPr>
+              <a:t>1</a:t>
+            </a:r>
+            <a:endParaRPr lang="en-SG" sz="1100" dirty="0">
+              <a:solidFill>
+                <a:srgbClr val="7030A0"/>
+              </a:solidFill>
+            </a:endParaRPr>
+          </a:p>
+        </p:txBody>
+      </p:sp>
+      <p:sp>
+        <p:nvSpPr>
+          <p:cNvPr id="86" name="TextBox 85">
+            <a:extLst>
+              <a:ext uri="{FF2B5EF4-FFF2-40B4-BE49-F238E27FC236}">
+                <a16:creationId xmlns:a16="http://schemas.microsoft.com/office/drawing/2014/main" id="{D574AC6F-3236-4981-BDF6-B0583433DFCE}"/>
+              </a:ext>
+            </a:extLst>
+          </p:cNvPr>
+          <p:cNvSpPr txBox="1"/>
+          <p:nvPr/>
+        </p:nvSpPr>
+        <p:spPr>
+          <a:xfrm>
+            <a:off x="7236514" y="3674572"/>
+            <a:ext cx="189257" cy="178683"/>
+          </a:xfrm>
+          <a:prstGeom prst="rect">
+            <a:avLst/>
+          </a:prstGeom>
+          <a:noFill/>
+        </p:spPr>
+        <p:txBody>
+          <a:bodyPr wrap="square" lIns="0" tIns="0" rIns="0" bIns="0" rtlCol="0">
+            <a:noAutofit/>
+          </a:bodyPr>
+          <a:lstStyle/>
+          <a:p>
+            <a:pPr algn="ctr"/>
+            <a:r>
+              <a:rPr lang="en-US" sz="1100" dirty="0">
+                <a:solidFill>
+                  <a:srgbClr val="7030A0"/>
+                </a:solidFill>
+              </a:rPr>
+              <a:t>1</a:t>
+            </a:r>
+            <a:endParaRPr lang="en-SG" sz="1100" dirty="0">
+              <a:solidFill>
+                <a:srgbClr val="7030A0"/>
+              </a:solidFill>
+            </a:endParaRPr>
+          </a:p>
+        </p:txBody>
+      </p:sp>
+      <p:sp>
+        <p:nvSpPr>
+          <p:cNvPr id="91" name="TextBox 90">
+            <a:extLst>
+              <a:ext uri="{FF2B5EF4-FFF2-40B4-BE49-F238E27FC236}">
+                <a16:creationId xmlns:a16="http://schemas.microsoft.com/office/drawing/2014/main" id="{4CA4B329-FE41-434A-AD3F-F8BEE1DF8909}"/>
+              </a:ext>
+            </a:extLst>
+          </p:cNvPr>
+          <p:cNvSpPr txBox="1"/>
+          <p:nvPr/>
+        </p:nvSpPr>
+        <p:spPr>
+          <a:xfrm>
+            <a:off x="7239422" y="4049301"/>
+            <a:ext cx="189257" cy="178683"/>
+          </a:xfrm>
+          <a:prstGeom prst="rect">
+            <a:avLst/>
+          </a:prstGeom>
+          <a:noFill/>
+        </p:spPr>
+        <p:txBody>
+          <a:bodyPr wrap="square" lIns="0" tIns="0" rIns="0" bIns="0" rtlCol="0">
+            <a:noAutofit/>
+          </a:bodyPr>
+          <a:lstStyle/>
+          <a:p>
+            <a:pPr algn="ctr"/>
+            <a:r>
+              <a:rPr lang="en-US" sz="1100" dirty="0">
+                <a:solidFill>
+                  <a:srgbClr val="7030A0"/>
+                </a:solidFill>
+              </a:rPr>
+              <a:t>1</a:t>
+            </a:r>
+            <a:endParaRPr lang="en-SG" sz="1100" dirty="0">
+              <a:solidFill>
+                <a:srgbClr val="7030A0"/>
+              </a:solidFill>
+            </a:endParaRPr>
+          </a:p>
+        </p:txBody>
+      </p:sp>
+      <p:sp>
+        <p:nvSpPr>
+          <p:cNvPr id="92" name="TextBox 91">
+            <a:extLst>
+              <a:ext uri="{FF2B5EF4-FFF2-40B4-BE49-F238E27FC236}">
+                <a16:creationId xmlns:a16="http://schemas.microsoft.com/office/drawing/2014/main" id="{3A2BE380-E7EE-435F-BFC6-369264F48E0F}"/>
+              </a:ext>
+            </a:extLst>
+          </p:cNvPr>
+          <p:cNvSpPr txBox="1"/>
+          <p:nvPr/>
+        </p:nvSpPr>
+        <p:spPr>
+          <a:xfrm>
+            <a:off x="7252864" y="4360118"/>
+            <a:ext cx="189257" cy="178683"/>
+          </a:xfrm>
+          <a:prstGeom prst="rect">
+            <a:avLst/>
+          </a:prstGeom>
+          <a:noFill/>
+        </p:spPr>
+        <p:txBody>
+          <a:bodyPr wrap="square" lIns="0" tIns="0" rIns="0" bIns="0" rtlCol="0">
+            <a:noAutofit/>
+          </a:bodyPr>
+          <a:lstStyle/>
+          <a:p>
+            <a:pPr algn="ctr"/>
+            <a:r>
+              <a:rPr lang="en-US" sz="1100" dirty="0">
+                <a:solidFill>
+                  <a:srgbClr val="7030A0"/>
+                </a:solidFill>
+              </a:rPr>
+              <a:t>1</a:t>
+            </a:r>
+            <a:endParaRPr lang="en-SG" sz="1100" dirty="0">
+              <a:solidFill>
+                <a:srgbClr val="7030A0"/>
+              </a:solidFill>
+            </a:endParaRPr>
           </a:p>
         </p:txBody>
       </p:sp>

</xml_diff>